<commit_message>
Update CardMaker template presentation file
</commit_message>
<xml_diff>
--- a/src/BusinessCardMaker.Web/wwwroot/templates/CardMaker_Template.pptx
+++ b/src/BusinessCardMaker.Web/wwwroot/templates/CardMaker_Template.pptx
@@ -291,7 +291,7 @@
           <a:p>
             <a:fld id="{BCC983A3-8E0E-8243-8319-B16313B95AEA}" type="datetimeFigureOut">
               <a:rPr kumimoji="1" lang="x-none" altLang="en-US" smtClean="0"/>
-              <a:t>2025-11-30</a:t>
+              <a:t>2025-12-01</a:t>
             </a:fld>
             <a:endParaRPr kumimoji="1" lang="x-none" altLang="en-US"/>
           </a:p>
@@ -862,7 +862,7 @@
           <a:p>
             <a:fld id="{C364C96D-1823-A54A-BA0C-C931E11C312A}" type="datetimeFigureOut">
               <a:rPr kumimoji="1" lang="x-none" altLang="en-US" smtClean="0"/>
-              <a:t>2025-11-30</a:t>
+              <a:t>2025-12-01</a:t>
             </a:fld>
             <a:endParaRPr kumimoji="1" lang="x-none" altLang="en-US"/>
           </a:p>
@@ -1032,7 +1032,7 @@
           <a:p>
             <a:fld id="{C364C96D-1823-A54A-BA0C-C931E11C312A}" type="datetimeFigureOut">
               <a:rPr kumimoji="1" lang="x-none" altLang="en-US" smtClean="0"/>
-              <a:t>2025-11-30</a:t>
+              <a:t>2025-12-01</a:t>
             </a:fld>
             <a:endParaRPr kumimoji="1" lang="x-none" altLang="en-US"/>
           </a:p>
@@ -1212,7 +1212,7 @@
           <a:p>
             <a:fld id="{C364C96D-1823-A54A-BA0C-C931E11C312A}" type="datetimeFigureOut">
               <a:rPr kumimoji="1" lang="x-none" altLang="en-US" smtClean="0"/>
-              <a:t>2025-11-30</a:t>
+              <a:t>2025-12-01</a:t>
             </a:fld>
             <a:endParaRPr kumimoji="1" lang="x-none" altLang="en-US"/>
           </a:p>
@@ -1382,7 +1382,7 @@
           <a:p>
             <a:fld id="{C364C96D-1823-A54A-BA0C-C931E11C312A}" type="datetimeFigureOut">
               <a:rPr kumimoji="1" lang="x-none" altLang="en-US" smtClean="0"/>
-              <a:t>2025-11-30</a:t>
+              <a:t>2025-12-01</a:t>
             </a:fld>
             <a:endParaRPr kumimoji="1" lang="x-none" altLang="en-US"/>
           </a:p>
@@ -1628,7 +1628,7 @@
           <a:p>
             <a:fld id="{C364C96D-1823-A54A-BA0C-C931E11C312A}" type="datetimeFigureOut">
               <a:rPr kumimoji="1" lang="x-none" altLang="en-US" smtClean="0"/>
-              <a:t>2025-11-30</a:t>
+              <a:t>2025-12-01</a:t>
             </a:fld>
             <a:endParaRPr kumimoji="1" lang="x-none" altLang="en-US"/>
           </a:p>
@@ -1860,7 +1860,7 @@
           <a:p>
             <a:fld id="{C364C96D-1823-A54A-BA0C-C931E11C312A}" type="datetimeFigureOut">
               <a:rPr kumimoji="1" lang="x-none" altLang="en-US" smtClean="0"/>
-              <a:t>2025-11-30</a:t>
+              <a:t>2025-12-01</a:t>
             </a:fld>
             <a:endParaRPr kumimoji="1" lang="x-none" altLang="en-US"/>
           </a:p>
@@ -2227,7 +2227,7 @@
           <a:p>
             <a:fld id="{C364C96D-1823-A54A-BA0C-C931E11C312A}" type="datetimeFigureOut">
               <a:rPr kumimoji="1" lang="x-none" altLang="en-US" smtClean="0"/>
-              <a:t>2025-11-30</a:t>
+              <a:t>2025-12-01</a:t>
             </a:fld>
             <a:endParaRPr kumimoji="1" lang="x-none" altLang="en-US"/>
           </a:p>
@@ -2345,7 +2345,7 @@
           <a:p>
             <a:fld id="{C364C96D-1823-A54A-BA0C-C931E11C312A}" type="datetimeFigureOut">
               <a:rPr kumimoji="1" lang="x-none" altLang="en-US" smtClean="0"/>
-              <a:t>2025-11-30</a:t>
+              <a:t>2025-12-01</a:t>
             </a:fld>
             <a:endParaRPr kumimoji="1" lang="x-none" altLang="en-US"/>
           </a:p>
@@ -2440,7 +2440,7 @@
           <a:p>
             <a:fld id="{C364C96D-1823-A54A-BA0C-C931E11C312A}" type="datetimeFigureOut">
               <a:rPr kumimoji="1" lang="x-none" altLang="en-US" smtClean="0"/>
-              <a:t>2025-11-30</a:t>
+              <a:t>2025-12-01</a:t>
             </a:fld>
             <a:endParaRPr kumimoji="1" lang="x-none" altLang="en-US"/>
           </a:p>
@@ -2717,7 +2717,7 @@
           <a:p>
             <a:fld id="{C364C96D-1823-A54A-BA0C-C931E11C312A}" type="datetimeFigureOut">
               <a:rPr kumimoji="1" lang="x-none" altLang="en-US" smtClean="0"/>
-              <a:t>2025-11-30</a:t>
+              <a:t>2025-12-01</a:t>
             </a:fld>
             <a:endParaRPr kumimoji="1" lang="x-none" altLang="en-US"/>
           </a:p>
@@ -2974,7 +2974,7 @@
           <a:p>
             <a:fld id="{C364C96D-1823-A54A-BA0C-C931E11C312A}" type="datetimeFigureOut">
               <a:rPr kumimoji="1" lang="x-none" altLang="en-US" smtClean="0"/>
-              <a:t>2025-11-30</a:t>
+              <a:t>2025-12-01</a:t>
             </a:fld>
             <a:endParaRPr kumimoji="1" lang="x-none" altLang="en-US"/>
           </a:p>
@@ -3187,7 +3187,7 @@
           <a:p>
             <a:fld id="{C364C96D-1823-A54A-BA0C-C931E11C312A}" type="datetimeFigureOut">
               <a:rPr kumimoji="1" lang="x-none" altLang="en-US" smtClean="0"/>
-              <a:t>2025-11-30</a:t>
+              <a:t>2025-12-01</a:t>
             </a:fld>
             <a:endParaRPr kumimoji="1" lang="x-none" altLang="en-US"/>
           </a:p>
@@ -3806,8 +3806,8 @@
         </p:nvSpPr>
         <p:spPr>
           <a:xfrm>
-            <a:off x="2159876" y="1648059"/>
-            <a:ext cx="1018198" cy="199222"/>
+            <a:off x="2662534" y="1472980"/>
+            <a:ext cx="465758" cy="199222"/>
           </a:xfrm>
           <a:prstGeom prst="rect">
             <a:avLst/>
@@ -3820,7 +3820,7 @@
           </a:bodyPr>
           <a:lstStyle/>
           <a:p>
-            <a:pPr algn="r">
+            <a:pPr algn="ctr">
               <a:lnSpc>
                 <a:spcPts val="850"/>
               </a:lnSpc>
@@ -4419,7 +4419,27 @@
       </a:bgFillStyleLst>
     </a:fmtScheme>
   </a:themeElements>
-  <a:objectDefaults/>
+  <a:objectDefaults>
+    <a:txDef>
+      <a:spPr>
+        <a:noFill/>
+      </a:spPr>
+      <a:bodyPr wrap="square" rtlCol="0">
+        <a:spAutoFit/>
+      </a:bodyPr>
+      <a:lstStyle>
+        <a:defPPr algn="r">
+          <a:lnSpc>
+            <a:spcPts val="850"/>
+          </a:lnSpc>
+          <a:defRPr kumimoji="1" sz="600" dirty="0">
+            <a:latin typeface="Inter" panose="02000503000000020004" pitchFamily="2" charset="0"/>
+            <a:ea typeface="Noto Sans CJK KR Medium" panose="020B0500000000000000" pitchFamily="34" charset="-128"/>
+          </a:defRPr>
+        </a:defPPr>
+      </a:lstStyle>
+    </a:txDef>
+  </a:objectDefaults>
   <a:extraClrSchemeLst/>
   <a:extLst>
     <a:ext uri="{05A4C25C-085E-4340-85A3-A5531E510DB2}">
@@ -4725,33 +4745,6 @@
 </file>
 
 <file path=customXml/item1.xml><?xml version="1.0" encoding="utf-8"?>
-<?mso-contentType ?>
-<FormTemplates xmlns="http://schemas.microsoft.com/sharepoint/v3/contenttype/forms">
-  <Display>DocumentLibraryForm</Display>
-  <Edit>DocumentLibraryForm</Edit>
-  <New>DocumentLibraryForm</New>
-</FormTemplates>
-</file>
-
-<file path=customXml/item2.xml><?xml version="1.0" encoding="utf-8"?>
-<p:properties xmlns:p="http://schemas.microsoft.com/office/2006/metadata/properties" xmlns:xsi="http://www.w3.org/2001/XMLSchema-instance" xmlns:pc="http://schemas.microsoft.com/office/infopath/2007/PartnerControls">
-  <documentManagement>
-    <lcf76f155ced4ddcb4097134ff3c332f xmlns="91bad30a-9f33-46ea-9152-79a672abe8bc">
-      <Terms xmlns="http://schemas.microsoft.com/office/infopath/2007/PartnerControls"/>
-    </lcf76f155ced4ddcb4097134ff3c332f>
-    <TaxCatchAll xmlns="a9ab9ea2-8dcc-430b-8acd-2c02023853c7" xsi:nil="true"/>
-    <_xc0ac__xc6a9__xc790_ xmlns="91bad30a-9f33-46ea-9152-79a672abe8bc">
-      <UserInfo>
-        <DisplayName/>
-        <AccountId xsi:nil="true"/>
-        <AccountType/>
-      </UserInfo>
-    </_xc0ac__xc6a9__xc790_>
-  </documentManagement>
-</p:properties>
-</file>
-
-<file path=customXml/item3.xml><?xml version="1.0" encoding="utf-8"?>
 <ct:contentTypeSchema xmlns:ct="http://schemas.microsoft.com/office/2006/metadata/contentType" xmlns:ma="http://schemas.microsoft.com/office/2006/metadata/properties/metaAttributes" ct:_="" ma:_="" ma:contentTypeName="문서" ma:contentTypeID="0x0101000137F82A4FE7434A948CF3D34D59947F" ma:contentTypeVersion="15" ma:contentTypeDescription="새 문서를 만듭니다." ma:contentTypeScope="" ma:versionID="c5b60202a6941c2d2129ee17c58a5b59">
   <xsd:schema xmlns:xsd="http://www.w3.org/2001/XMLSchema" xmlns:xs="http://www.w3.org/2001/XMLSchema" xmlns:p="http://schemas.microsoft.com/office/2006/metadata/properties" xmlns:ns2="91bad30a-9f33-46ea-9152-79a672abe8bc" xmlns:ns3="a9ab9ea2-8dcc-430b-8acd-2c02023853c7" targetNamespace="http://schemas.microsoft.com/office/2006/metadata/properties" ma:root="true" ma:fieldsID="b893eb76693fcc399e26a573c35bd9fe" ns2:_="" ns3:_="">
     <xsd:import namespace="91bad30a-9f33-46ea-9152-79a672abe8bc"/>
@@ -4984,10 +4977,48 @@
 </ct:contentTypeSchema>
 </file>
 
+<file path=customXml/item2.xml><?xml version="1.0" encoding="utf-8"?>
+<p:properties xmlns:p="http://schemas.microsoft.com/office/2006/metadata/properties" xmlns:xsi="http://www.w3.org/2001/XMLSchema-instance" xmlns:pc="http://schemas.microsoft.com/office/infopath/2007/PartnerControls">
+  <documentManagement>
+    <lcf76f155ced4ddcb4097134ff3c332f xmlns="91bad30a-9f33-46ea-9152-79a672abe8bc">
+      <Terms xmlns="http://schemas.microsoft.com/office/infopath/2007/PartnerControls"/>
+    </lcf76f155ced4ddcb4097134ff3c332f>
+    <TaxCatchAll xmlns="a9ab9ea2-8dcc-430b-8acd-2c02023853c7" xsi:nil="true"/>
+    <_xc0ac__xc6a9__xc790_ xmlns="91bad30a-9f33-46ea-9152-79a672abe8bc">
+      <UserInfo>
+        <DisplayName/>
+        <AccountId xsi:nil="true"/>
+        <AccountType/>
+      </UserInfo>
+    </_xc0ac__xc6a9__xc790_>
+  </documentManagement>
+</p:properties>
+</file>
+
+<file path=customXml/item3.xml><?xml version="1.0" encoding="utf-8"?>
+<?mso-contentType ?>
+<FormTemplates xmlns="http://schemas.microsoft.com/sharepoint/v3/contenttype/forms">
+  <Display>DocumentLibraryForm</Display>
+  <Edit>DocumentLibraryForm</Edit>
+  <New>DocumentLibraryForm</New>
+</FormTemplates>
+</file>
+
 <file path=customXml/itemProps1.xml><?xml version="1.0" encoding="utf-8"?>
-<ds:datastoreItem xmlns:ds="http://schemas.openxmlformats.org/officeDocument/2006/customXml" ds:itemID="{EC0C9AB8-A8B3-49ED-9F31-38D242935EF4}">
+<ds:datastoreItem xmlns:ds="http://schemas.openxmlformats.org/officeDocument/2006/customXml" ds:itemID="{B8A0ED18-863D-4D9F-BF93-84BA4245EBFB}">
   <ds:schemaRefs>
-    <ds:schemaRef ds:uri="http://schemas.microsoft.com/sharepoint/v3/contenttype/forms"/>
+    <ds:schemaRef ds:uri="http://schemas.microsoft.com/office/2006/metadata/contentType"/>
+    <ds:schemaRef ds:uri="http://schemas.microsoft.com/office/2006/metadata/properties/metaAttributes"/>
+    <ds:schemaRef ds:uri="http://www.w3.org/2001/XMLSchema"/>
+    <ds:schemaRef ds:uri="http://schemas.microsoft.com/office/2006/metadata/properties"/>
+    <ds:schemaRef ds:uri="91bad30a-9f33-46ea-9152-79a672abe8bc"/>
+    <ds:schemaRef ds:uri="a9ab9ea2-8dcc-430b-8acd-2c02023853c7"/>
+    <ds:schemaRef ds:uri="http://schemas.microsoft.com/office/2006/documentManagement/types"/>
+    <ds:schemaRef ds:uri="http://schemas.microsoft.com/office/infopath/2007/PartnerControls"/>
+    <ds:schemaRef ds:uri="http://schemas.openxmlformats.org/package/2006/metadata/core-properties"/>
+    <ds:schemaRef ds:uri="http://purl.org/dc/elements/1.1/"/>
+    <ds:schemaRef ds:uri="http://purl.org/dc/terms/"/>
+    <ds:schemaRef ds:uri="http://schemas.microsoft.com/internal/obd"/>
   </ds:schemaRefs>
 </ds:datastoreItem>
 </file>
@@ -5010,20 +5041,9 @@
 </file>
 
 <file path=customXml/itemProps3.xml><?xml version="1.0" encoding="utf-8"?>
-<ds:datastoreItem xmlns:ds="http://schemas.openxmlformats.org/officeDocument/2006/customXml" ds:itemID="{B8A0ED18-863D-4D9F-BF93-84BA4245EBFB}">
+<ds:datastoreItem xmlns:ds="http://schemas.openxmlformats.org/officeDocument/2006/customXml" ds:itemID="{EC0C9AB8-A8B3-49ED-9F31-38D242935EF4}">
   <ds:schemaRefs>
-    <ds:schemaRef ds:uri="http://schemas.microsoft.com/office/2006/metadata/contentType"/>
-    <ds:schemaRef ds:uri="http://schemas.microsoft.com/office/2006/metadata/properties/metaAttributes"/>
-    <ds:schemaRef ds:uri="http://www.w3.org/2001/XMLSchema"/>
-    <ds:schemaRef ds:uri="http://schemas.microsoft.com/office/2006/metadata/properties"/>
-    <ds:schemaRef ds:uri="91bad30a-9f33-46ea-9152-79a672abe8bc"/>
-    <ds:schemaRef ds:uri="a9ab9ea2-8dcc-430b-8acd-2c02023853c7"/>
-    <ds:schemaRef ds:uri="http://schemas.microsoft.com/office/2006/documentManagement/types"/>
-    <ds:schemaRef ds:uri="http://schemas.microsoft.com/office/infopath/2007/PartnerControls"/>
-    <ds:schemaRef ds:uri="http://schemas.openxmlformats.org/package/2006/metadata/core-properties"/>
-    <ds:schemaRef ds:uri="http://purl.org/dc/elements/1.1/"/>
-    <ds:schemaRef ds:uri="http://purl.org/dc/terms/"/>
-    <ds:schemaRef ds:uri="http://schemas.microsoft.com/internal/obd"/>
+    <ds:schemaRef ds:uri="http://schemas.microsoft.com/sharepoint/v3/contenttype/forms"/>
   </ds:schemaRefs>
 </ds:datastoreItem>
 </file>
</xml_diff>

<commit_message>
No code changes detected; skipping commit.
</commit_message>
<xml_diff>
--- a/src/BusinessCardMaker.Web/wwwroot/templates/CardMaker_Template.pptx
+++ b/src/BusinessCardMaker.Web/wwwroot/templates/CardMaker_Template.pptx
@@ -3801,22 +3801,29 @@
               </a:ext>
             </a:extLst>
           </p:cNvPr>
-          <p:cNvSpPr txBox="1"/>
+          <p:cNvSpPr txBox="1">
+            <a:spLocks/>
+          </p:cNvSpPr>
           <p:nvPr/>
         </p:nvSpPr>
         <p:spPr>
           <a:xfrm>
-            <a:off x="2662534" y="1472980"/>
-            <a:ext cx="465758" cy="199222"/>
+            <a:off x="2748382" y="1305047"/>
+            <a:ext cx="360000" cy="360000"/>
           </a:xfrm>
           <a:prstGeom prst="rect">
             <a:avLst/>
           </a:prstGeom>
           <a:noFill/>
+          <a:ln>
+            <a:solidFill>
+              <a:schemeClr val="accent1"/>
+            </a:solidFill>
+          </a:ln>
         </p:spPr>
         <p:txBody>
-          <a:bodyPr wrap="square" rtlCol="0">
-            <a:spAutoFit/>
+          <a:bodyPr wrap="square" lIns="0" tIns="0" rIns="0" bIns="0" rtlCol="0" anchor="ctr">
+            <a:normAutofit/>
           </a:bodyPr>
           <a:lstStyle/>
           <a:p>
@@ -3826,27 +3833,27 @@
               </a:lnSpc>
             </a:pPr>
             <a:r>
-              <a:rPr kumimoji="1" lang="en-US" altLang="en-US" sz="600" dirty="0">
+              <a:rPr kumimoji="1" lang="en-US" altLang="en-US" sz="500" dirty="0">
                 <a:latin typeface="Inter" panose="02000503000000020004" pitchFamily="2" charset="0"/>
                 <a:ea typeface="Noto Sans CJK KR Medium" panose="020B0500000000000000" pitchFamily="34" charset="-128"/>
               </a:rPr>
               <a:t>{</a:t>
             </a:r>
             <a:r>
-              <a:rPr kumimoji="1" lang="en-US" altLang="en-US" sz="600" dirty="0" err="1">
+              <a:rPr kumimoji="1" lang="en-US" altLang="en-US" sz="500" dirty="0" err="1">
                 <a:latin typeface="Inter" panose="02000503000000020004" pitchFamily="2" charset="0"/>
                 <a:ea typeface="Noto Sans CJK KR Medium" panose="020B0500000000000000" pitchFamily="34" charset="-128"/>
               </a:rPr>
               <a:t>qrcode</a:t>
             </a:r>
             <a:r>
-              <a:rPr kumimoji="1" lang="en-US" altLang="en-US" sz="600" dirty="0">
+              <a:rPr kumimoji="1" lang="en-US" altLang="en-US" sz="500" dirty="0">
                 <a:latin typeface="Inter" panose="02000503000000020004" pitchFamily="2" charset="0"/>
                 <a:ea typeface="Noto Sans CJK KR Medium" panose="020B0500000000000000" pitchFamily="34" charset="-128"/>
               </a:rPr>
               <a:t>}</a:t>
             </a:r>
-            <a:endParaRPr kumimoji="1" lang="x-none" altLang="en-US" sz="600" dirty="0">
+            <a:endParaRPr kumimoji="1" lang="x-none" altLang="en-US" sz="500" dirty="0">
               <a:latin typeface="Inter" panose="02000503000000020004" pitchFamily="2" charset="0"/>
               <a:ea typeface="Noto Sans CJK KR Medium" panose="020B0500000000000000" pitchFamily="34" charset="-128"/>
             </a:endParaRPr>
@@ -4745,6 +4752,33 @@
 </file>
 
 <file path=customXml/item1.xml><?xml version="1.0" encoding="utf-8"?>
+<?mso-contentType ?>
+<FormTemplates xmlns="http://schemas.microsoft.com/sharepoint/v3/contenttype/forms">
+  <Display>DocumentLibraryForm</Display>
+  <Edit>DocumentLibraryForm</Edit>
+  <New>DocumentLibraryForm</New>
+</FormTemplates>
+</file>
+
+<file path=customXml/item2.xml><?xml version="1.0" encoding="utf-8"?>
+<p:properties xmlns:p="http://schemas.microsoft.com/office/2006/metadata/properties" xmlns:xsi="http://www.w3.org/2001/XMLSchema-instance" xmlns:pc="http://schemas.microsoft.com/office/infopath/2007/PartnerControls">
+  <documentManagement>
+    <lcf76f155ced4ddcb4097134ff3c332f xmlns="91bad30a-9f33-46ea-9152-79a672abe8bc">
+      <Terms xmlns="http://schemas.microsoft.com/office/infopath/2007/PartnerControls"/>
+    </lcf76f155ced4ddcb4097134ff3c332f>
+    <TaxCatchAll xmlns="a9ab9ea2-8dcc-430b-8acd-2c02023853c7" xsi:nil="true"/>
+    <_xc0ac__xc6a9__xc790_ xmlns="91bad30a-9f33-46ea-9152-79a672abe8bc">
+      <UserInfo>
+        <DisplayName/>
+        <AccountId xsi:nil="true"/>
+        <AccountType/>
+      </UserInfo>
+    </_xc0ac__xc6a9__xc790_>
+  </documentManagement>
+</p:properties>
+</file>
+
+<file path=customXml/item3.xml><?xml version="1.0" encoding="utf-8"?>
 <ct:contentTypeSchema xmlns:ct="http://schemas.microsoft.com/office/2006/metadata/contentType" xmlns:ma="http://schemas.microsoft.com/office/2006/metadata/properties/metaAttributes" ct:_="" ma:_="" ma:contentTypeName="문서" ma:contentTypeID="0x0101000137F82A4FE7434A948CF3D34D59947F" ma:contentTypeVersion="15" ma:contentTypeDescription="새 문서를 만듭니다." ma:contentTypeScope="" ma:versionID="c5b60202a6941c2d2129ee17c58a5b59">
   <xsd:schema xmlns:xsd="http://www.w3.org/2001/XMLSchema" xmlns:xs="http://www.w3.org/2001/XMLSchema" xmlns:p="http://schemas.microsoft.com/office/2006/metadata/properties" xmlns:ns2="91bad30a-9f33-46ea-9152-79a672abe8bc" xmlns:ns3="a9ab9ea2-8dcc-430b-8acd-2c02023853c7" targetNamespace="http://schemas.microsoft.com/office/2006/metadata/properties" ma:root="true" ma:fieldsID="b893eb76693fcc399e26a573c35bd9fe" ns2:_="" ns3:_="">
     <xsd:import namespace="91bad30a-9f33-46ea-9152-79a672abe8bc"/>
@@ -4977,48 +5011,10 @@
 </ct:contentTypeSchema>
 </file>
 
-<file path=customXml/item2.xml><?xml version="1.0" encoding="utf-8"?>
-<p:properties xmlns:p="http://schemas.microsoft.com/office/2006/metadata/properties" xmlns:xsi="http://www.w3.org/2001/XMLSchema-instance" xmlns:pc="http://schemas.microsoft.com/office/infopath/2007/PartnerControls">
-  <documentManagement>
-    <lcf76f155ced4ddcb4097134ff3c332f xmlns="91bad30a-9f33-46ea-9152-79a672abe8bc">
-      <Terms xmlns="http://schemas.microsoft.com/office/infopath/2007/PartnerControls"/>
-    </lcf76f155ced4ddcb4097134ff3c332f>
-    <TaxCatchAll xmlns="a9ab9ea2-8dcc-430b-8acd-2c02023853c7" xsi:nil="true"/>
-    <_xc0ac__xc6a9__xc790_ xmlns="91bad30a-9f33-46ea-9152-79a672abe8bc">
-      <UserInfo>
-        <DisplayName/>
-        <AccountId xsi:nil="true"/>
-        <AccountType/>
-      </UserInfo>
-    </_xc0ac__xc6a9__xc790_>
-  </documentManagement>
-</p:properties>
-</file>
-
-<file path=customXml/item3.xml><?xml version="1.0" encoding="utf-8"?>
-<?mso-contentType ?>
-<FormTemplates xmlns="http://schemas.microsoft.com/sharepoint/v3/contenttype/forms">
-  <Display>DocumentLibraryForm</Display>
-  <Edit>DocumentLibraryForm</Edit>
-  <New>DocumentLibraryForm</New>
-</FormTemplates>
-</file>
-
 <file path=customXml/itemProps1.xml><?xml version="1.0" encoding="utf-8"?>
-<ds:datastoreItem xmlns:ds="http://schemas.openxmlformats.org/officeDocument/2006/customXml" ds:itemID="{B8A0ED18-863D-4D9F-BF93-84BA4245EBFB}">
+<ds:datastoreItem xmlns:ds="http://schemas.openxmlformats.org/officeDocument/2006/customXml" ds:itemID="{EC0C9AB8-A8B3-49ED-9F31-38D242935EF4}">
   <ds:schemaRefs>
-    <ds:schemaRef ds:uri="http://schemas.microsoft.com/office/2006/metadata/contentType"/>
-    <ds:schemaRef ds:uri="http://schemas.microsoft.com/office/2006/metadata/properties/metaAttributes"/>
-    <ds:schemaRef ds:uri="http://www.w3.org/2001/XMLSchema"/>
-    <ds:schemaRef ds:uri="http://schemas.microsoft.com/office/2006/metadata/properties"/>
-    <ds:schemaRef ds:uri="91bad30a-9f33-46ea-9152-79a672abe8bc"/>
-    <ds:schemaRef ds:uri="a9ab9ea2-8dcc-430b-8acd-2c02023853c7"/>
-    <ds:schemaRef ds:uri="http://schemas.microsoft.com/office/2006/documentManagement/types"/>
-    <ds:schemaRef ds:uri="http://schemas.microsoft.com/office/infopath/2007/PartnerControls"/>
-    <ds:schemaRef ds:uri="http://schemas.openxmlformats.org/package/2006/metadata/core-properties"/>
-    <ds:schemaRef ds:uri="http://purl.org/dc/elements/1.1/"/>
-    <ds:schemaRef ds:uri="http://purl.org/dc/terms/"/>
-    <ds:schemaRef ds:uri="http://schemas.microsoft.com/internal/obd"/>
+    <ds:schemaRef ds:uri="http://schemas.microsoft.com/sharepoint/v3/contenttype/forms"/>
   </ds:schemaRefs>
 </ds:datastoreItem>
 </file>
@@ -5041,9 +5037,20 @@
 </file>
 
 <file path=customXml/itemProps3.xml><?xml version="1.0" encoding="utf-8"?>
-<ds:datastoreItem xmlns:ds="http://schemas.openxmlformats.org/officeDocument/2006/customXml" ds:itemID="{EC0C9AB8-A8B3-49ED-9F31-38D242935EF4}">
+<ds:datastoreItem xmlns:ds="http://schemas.openxmlformats.org/officeDocument/2006/customXml" ds:itemID="{B8A0ED18-863D-4D9F-BF93-84BA4245EBFB}">
   <ds:schemaRefs>
-    <ds:schemaRef ds:uri="http://schemas.microsoft.com/sharepoint/v3/contenttype/forms"/>
+    <ds:schemaRef ds:uri="http://schemas.microsoft.com/office/2006/metadata/contentType"/>
+    <ds:schemaRef ds:uri="http://schemas.microsoft.com/office/2006/metadata/properties/metaAttributes"/>
+    <ds:schemaRef ds:uri="http://www.w3.org/2001/XMLSchema"/>
+    <ds:schemaRef ds:uri="http://schemas.microsoft.com/office/2006/metadata/properties"/>
+    <ds:schemaRef ds:uri="91bad30a-9f33-46ea-9152-79a672abe8bc"/>
+    <ds:schemaRef ds:uri="a9ab9ea2-8dcc-430b-8acd-2c02023853c7"/>
+    <ds:schemaRef ds:uri="http://schemas.microsoft.com/office/2006/documentManagement/types"/>
+    <ds:schemaRef ds:uri="http://schemas.microsoft.com/office/infopath/2007/PartnerControls"/>
+    <ds:schemaRef ds:uri="http://schemas.openxmlformats.org/package/2006/metadata/core-properties"/>
+    <ds:schemaRef ds:uri="http://purl.org/dc/elements/1.1/"/>
+    <ds:schemaRef ds:uri="http://purl.org/dc/terms/"/>
+    <ds:schemaRef ds:uri="http://schemas.microsoft.com/internal/obd"/>
   </ds:schemaRefs>
 </ds:datastoreItem>
 </file>
</xml_diff>